<commit_message>
Add in some updates to the commented out text
</commit_message>
<xml_diff>
--- a/magic-eight-ball/ReactPresentation.pptx
+++ b/magic-eight-ball/ReactPresentation.pptx
@@ -10677,8 +10677,13 @@
           <a:p>
             <a:r>
               <a:rPr lang="en-US" dirty="0"/>
-              <a:t>From there, navigate to C:\MagicEightBall</a:t>
-            </a:r>
+              <a:t>From there, navigate to C</a:t>
+            </a:r>
+            <a:r>
+              <a:rPr lang="en-US"/>
+              <a:t>:\MagicEightBall\magic-eight-ball</a:t>
+            </a:r>
+            <a:endParaRPr lang="en-US" dirty="0"/>
           </a:p>
           <a:p>
             <a:r>

</xml_diff>

<commit_message>
Forgot a . in app.css
</commit_message>
<xml_diff>
--- a/magic-eight-ball/ReactPresentation.pptx
+++ b/magic-eight-ball/ReactPresentation.pptx
@@ -6382,8 +6382,13 @@
             <a:pPr lvl="1"/>
             <a:r>
               <a:rPr lang="en-US" dirty="0"/>
-              <a:t>These divide sections off</a:t>
-            </a:r>
+              <a:t>These </a:t>
+            </a:r>
+            <a:r>
+              <a:rPr lang="en-US"/>
+              <a:t>are considered tags</a:t>
+            </a:r>
+            <a:endParaRPr lang="en-US" dirty="0"/>
           </a:p>
           <a:p>
             <a:r>
@@ -10677,13 +10682,8 @@
           <a:p>
             <a:r>
               <a:rPr lang="en-US" dirty="0"/>
-              <a:t>From there, navigate to C</a:t>
-            </a:r>
-            <a:r>
-              <a:rPr lang="en-US"/>
-              <a:t>:\MagicEightBall\magic-eight-ball</a:t>
-            </a:r>
-            <a:endParaRPr lang="en-US" dirty="0"/>
+              <a:t>From there, navigate to C:\MagicEightBall\magic-eight-ball</a:t>
+            </a:r>
           </a:p>
           <a:p>
             <a:r>

</xml_diff>

<commit_message>
wouldnt it be nice if I could math.floor right
</commit_message>
<xml_diff>
--- a/magic-eight-ball/ReactPresentation.pptx
+++ b/magic-eight-ball/ReactPresentation.pptx
@@ -5,7 +5,7 @@
     <p:sldMasterId id="2147483648" r:id="rId1"/>
   </p:sldMasterIdLst>
   <p:notesMasterIdLst>
-    <p:notesMasterId r:id="rId33"/>
+    <p:notesMasterId r:id="rId32"/>
   </p:notesMasterIdLst>
   <p:sldIdLst>
     <p:sldId id="256" r:id="rId2"/>
@@ -28,17 +28,16 @@
     <p:sldId id="271" r:id="rId19"/>
     <p:sldId id="272" r:id="rId20"/>
     <p:sldId id="287" r:id="rId21"/>
-    <p:sldId id="288" r:id="rId22"/>
-    <p:sldId id="289" r:id="rId23"/>
-    <p:sldId id="273" r:id="rId24"/>
-    <p:sldId id="274" r:id="rId25"/>
-    <p:sldId id="275" r:id="rId26"/>
-    <p:sldId id="290" r:id="rId27"/>
-    <p:sldId id="278" r:id="rId28"/>
-    <p:sldId id="291" r:id="rId29"/>
-    <p:sldId id="276" r:id="rId30"/>
-    <p:sldId id="277" r:id="rId31"/>
-    <p:sldId id="280" r:id="rId32"/>
+    <p:sldId id="289" r:id="rId22"/>
+    <p:sldId id="273" r:id="rId23"/>
+    <p:sldId id="274" r:id="rId24"/>
+    <p:sldId id="275" r:id="rId25"/>
+    <p:sldId id="290" r:id="rId26"/>
+    <p:sldId id="278" r:id="rId27"/>
+    <p:sldId id="291" r:id="rId28"/>
+    <p:sldId id="276" r:id="rId29"/>
+    <p:sldId id="277" r:id="rId30"/>
+    <p:sldId id="280" r:id="rId31"/>
   </p:sldIdLst>
   <p:sldSz cx="12192000" cy="6858000"/>
   <p:notesSz cx="6858000" cy="9144000"/>
@@ -1660,7 +1659,7 @@
     </p:spTree>
     <p:extLst>
       <p:ext uri="{BB962C8B-B14F-4D97-AF65-F5344CB8AC3E}">
-        <p14:creationId xmlns:p14="http://schemas.microsoft.com/office/powerpoint/2010/main" val="1013356341"/>
+        <p14:creationId xmlns:p14="http://schemas.microsoft.com/office/powerpoint/2010/main" val="1401309316"/>
       </p:ext>
     </p:extLst>
   </p:cSld>
@@ -1744,7 +1743,7 @@
     </p:spTree>
     <p:extLst>
       <p:ext uri="{BB962C8B-B14F-4D97-AF65-F5344CB8AC3E}">
-        <p14:creationId xmlns:p14="http://schemas.microsoft.com/office/powerpoint/2010/main" val="1401309316"/>
+        <p14:creationId xmlns:p14="http://schemas.microsoft.com/office/powerpoint/2010/main" val="12178410"/>
       </p:ext>
     </p:extLst>
   </p:cSld>
@@ -1828,7 +1827,7 @@
     </p:spTree>
     <p:extLst>
       <p:ext uri="{BB962C8B-B14F-4D97-AF65-F5344CB8AC3E}">
-        <p14:creationId xmlns:p14="http://schemas.microsoft.com/office/powerpoint/2010/main" val="12178410"/>
+        <p14:creationId xmlns:p14="http://schemas.microsoft.com/office/powerpoint/2010/main" val="3313755763"/>
       </p:ext>
     </p:extLst>
   </p:cSld>
@@ -1912,7 +1911,7 @@
     </p:spTree>
     <p:extLst>
       <p:ext uri="{BB962C8B-B14F-4D97-AF65-F5344CB8AC3E}">
-        <p14:creationId xmlns:p14="http://schemas.microsoft.com/office/powerpoint/2010/main" val="3313755763"/>
+        <p14:creationId xmlns:p14="http://schemas.microsoft.com/office/powerpoint/2010/main" val="2551119648"/>
       </p:ext>
     </p:extLst>
   </p:cSld>
@@ -1996,7 +1995,7 @@
     </p:spTree>
     <p:extLst>
       <p:ext uri="{BB962C8B-B14F-4D97-AF65-F5344CB8AC3E}">
-        <p14:creationId xmlns:p14="http://schemas.microsoft.com/office/powerpoint/2010/main" val="2551119648"/>
+        <p14:creationId xmlns:p14="http://schemas.microsoft.com/office/powerpoint/2010/main" val="1965334167"/>
       </p:ext>
     </p:extLst>
   </p:cSld>
@@ -2080,7 +2079,7 @@
     </p:spTree>
     <p:extLst>
       <p:ext uri="{BB962C8B-B14F-4D97-AF65-F5344CB8AC3E}">
-        <p14:creationId xmlns:p14="http://schemas.microsoft.com/office/powerpoint/2010/main" val="1965334167"/>
+        <p14:creationId xmlns:p14="http://schemas.microsoft.com/office/powerpoint/2010/main" val="3674173676"/>
       </p:ext>
     </p:extLst>
   </p:cSld>
@@ -2164,7 +2163,7 @@
     </p:spTree>
     <p:extLst>
       <p:ext uri="{BB962C8B-B14F-4D97-AF65-F5344CB8AC3E}">
-        <p14:creationId xmlns:p14="http://schemas.microsoft.com/office/powerpoint/2010/main" val="3674173676"/>
+        <p14:creationId xmlns:p14="http://schemas.microsoft.com/office/powerpoint/2010/main" val="2449961838"/>
       </p:ext>
     </p:extLst>
   </p:cSld>
@@ -2248,7 +2247,7 @@
     </p:spTree>
     <p:extLst>
       <p:ext uri="{BB962C8B-B14F-4D97-AF65-F5344CB8AC3E}">
-        <p14:creationId xmlns:p14="http://schemas.microsoft.com/office/powerpoint/2010/main" val="2449961838"/>
+        <p14:creationId xmlns:p14="http://schemas.microsoft.com/office/powerpoint/2010/main" val="182653527"/>
       </p:ext>
     </p:extLst>
   </p:cSld>
@@ -2332,7 +2331,7 @@
     </p:spTree>
     <p:extLst>
       <p:ext uri="{BB962C8B-B14F-4D97-AF65-F5344CB8AC3E}">
-        <p14:creationId xmlns:p14="http://schemas.microsoft.com/office/powerpoint/2010/main" val="182653527"/>
+        <p14:creationId xmlns:p14="http://schemas.microsoft.com/office/powerpoint/2010/main" val="2168919981"/>
       </p:ext>
     </p:extLst>
   </p:cSld>
@@ -2492,90 +2491,6 @@
             <a:fld id="{490B8E3F-3761-4492-B19A-20CD3A641C48}" type="slidenum">
               <a:rPr lang="en-US" smtClean="0"/>
               <a:t>30</a:t>
-            </a:fld>
-            <a:endParaRPr lang="en-US"/>
-          </a:p>
-        </p:txBody>
-      </p:sp>
-    </p:spTree>
-    <p:extLst>
-      <p:ext uri="{BB962C8B-B14F-4D97-AF65-F5344CB8AC3E}">
-        <p14:creationId xmlns:p14="http://schemas.microsoft.com/office/powerpoint/2010/main" val="2168919981"/>
-      </p:ext>
-    </p:extLst>
-  </p:cSld>
-  <p:clrMapOvr>
-    <a:masterClrMapping/>
-  </p:clrMapOvr>
-</p:notes>
-</file>
-
-<file path=ppt/notesSlides/notesSlide31.xml><?xml version="1.0" encoding="utf-8"?>
-<p:notes xmlns:a="http://schemas.openxmlformats.org/drawingml/2006/main" xmlns:r="http://schemas.openxmlformats.org/officeDocument/2006/relationships" xmlns:p="http://schemas.openxmlformats.org/presentationml/2006/main">
-  <p:cSld>
-    <p:spTree>
-      <p:nvGrpSpPr>
-        <p:cNvPr id="1" name=""/>
-        <p:cNvGrpSpPr/>
-        <p:nvPr/>
-      </p:nvGrpSpPr>
-      <p:grpSpPr>
-        <a:xfrm>
-          <a:off x="0" y="0"/>
-          <a:ext cx="0" cy="0"/>
-          <a:chOff x="0" y="0"/>
-          <a:chExt cx="0" cy="0"/>
-        </a:xfrm>
-      </p:grpSpPr>
-      <p:sp>
-        <p:nvSpPr>
-          <p:cNvPr id="2" name="Slide Image Placeholder 1"/>
-          <p:cNvSpPr>
-            <a:spLocks noGrp="1" noRot="1" noChangeAspect="1"/>
-          </p:cNvSpPr>
-          <p:nvPr>
-            <p:ph type="sldImg"/>
-          </p:nvPr>
-        </p:nvSpPr>
-        <p:spPr/>
-      </p:sp>
-      <p:sp>
-        <p:nvSpPr>
-          <p:cNvPr id="3" name="Notes Placeholder 2"/>
-          <p:cNvSpPr>
-            <a:spLocks noGrp="1"/>
-          </p:cNvSpPr>
-          <p:nvPr>
-            <p:ph type="body" idx="1"/>
-          </p:nvPr>
-        </p:nvSpPr>
-        <p:spPr/>
-        <p:txBody>
-          <a:bodyPr/>
-          <a:lstStyle/>
-          <a:p>
-            <a:endParaRPr lang="en-US"/>
-          </a:p>
-        </p:txBody>
-      </p:sp>
-      <p:sp>
-        <p:nvSpPr>
-          <p:cNvPr id="4" name="Slide Number Placeholder 3"/>
-          <p:cNvSpPr>
-            <a:spLocks noGrp="1"/>
-          </p:cNvSpPr>
-          <p:nvPr>
-            <p:ph type="sldNum" sz="quarter" idx="10"/>
-          </p:nvPr>
-        </p:nvSpPr>
-        <p:spPr/>
-        <p:txBody>
-          <a:bodyPr/>
-          <a:lstStyle/>
-          <a:p>
-            <a:fld id="{490B8E3F-3761-4492-B19A-20CD3A641C48}" type="slidenum">
-              <a:rPr lang="en-US" smtClean="0"/>
-              <a:t>31</a:t>
             </a:fld>
             <a:endParaRPr lang="en-US"/>
           </a:p>
@@ -7688,20 +7603,20 @@
           <a:p>
             <a:r>
               <a:rPr lang="en-US" dirty="0"/>
-              <a:t>You’ll notice a common file, let’s import it!</a:t>
+              <a:t>You’ll notice a common file..</a:t>
             </a:r>
           </a:p>
           <a:p>
             <a:pPr lvl="1"/>
             <a:r>
               <a:rPr lang="en-US" dirty="0"/>
-              <a:t>Uncomment: import * as Common from '../common’;</a:t>
-            </a:r>
-          </a:p>
-          <a:p>
-            <a:r>
-              <a:rPr lang="en-US" dirty="0"/>
-              <a:t>Wait what did we just do? </a:t>
+              <a:t>import * as Common from '../common’;</a:t>
+            </a:r>
+          </a:p>
+          <a:p>
+            <a:r>
+              <a:rPr lang="en-US" dirty="0"/>
+              <a:t>What does that do?</a:t>
             </a:r>
           </a:p>
           <a:p>
@@ -8320,7 +8235,7 @@
           <p:cNvPr id="2" name="Title 1">
             <a:extLst>
               <a:ext uri="{FF2B5EF4-FFF2-40B4-BE49-F238E27FC236}">
-                <a16:creationId xmlns:a16="http://schemas.microsoft.com/office/drawing/2014/main" id="{5D267204-0805-4803-B547-F07711180908}"/>
+                <a16:creationId xmlns:a16="http://schemas.microsoft.com/office/drawing/2014/main" id="{DAE61340-EB0C-43F4-82F8-3A55E83D0AAA}"/>
               </a:ext>
             </a:extLst>
           </p:cNvPr>
@@ -8338,7 +8253,7 @@
           <a:p>
             <a:r>
               <a:rPr lang="en-US" dirty="0"/>
-              <a:t>Okay, NOW let’s generate some fortunes</a:t>
+              <a:t>So how do we get a fortune?</a:t>
             </a:r>
           </a:p>
         </p:txBody>
@@ -8348,7 +8263,7 @@
           <p:cNvPr id="3" name="Content Placeholder 2">
             <a:extLst>
               <a:ext uri="{FF2B5EF4-FFF2-40B4-BE49-F238E27FC236}">
-                <a16:creationId xmlns:a16="http://schemas.microsoft.com/office/drawing/2014/main" id="{AB078261-7574-4AF8-A565-66F3F668CCA5}"/>
+                <a16:creationId xmlns:a16="http://schemas.microsoft.com/office/drawing/2014/main" id="{55569AA9-4759-411B-8203-AA4685AF3F0C}"/>
               </a:ext>
             </a:extLst>
           </p:cNvPr>
@@ -8361,141 +8276,20 @@
         </p:nvSpPr>
         <p:spPr/>
         <p:txBody>
-          <a:bodyPr>
-            <a:normAutofit/>
-          </a:bodyPr>
-          <a:lstStyle/>
-          <a:p>
-            <a:pPr marL="0" indent="0">
-              <a:buNone/>
-            </a:pPr>
-            <a:r>
-              <a:rPr lang="en-US" dirty="0"/>
-              <a:t>let fortunes: </a:t>
-            </a:r>
-            <a:r>
-              <a:rPr lang="en-US" dirty="0" err="1"/>
-              <a:t>Common.Fortune</a:t>
-            </a:r>
-            <a:r>
-              <a:rPr lang="en-US" dirty="0"/>
-              <a:t>[] = [</a:t>
-            </a:r>
-          </a:p>
-          <a:p>
-            <a:pPr marL="0" indent="0">
-              <a:buNone/>
-            </a:pPr>
-            <a:r>
-              <a:rPr lang="en-US" dirty="0"/>
-              <a:t>{</a:t>
-            </a:r>
-            <a:r>
-              <a:rPr lang="en-US" dirty="0" err="1"/>
-              <a:t>fortuneType</a:t>
-            </a:r>
-            <a:r>
-              <a:rPr lang="en-US" dirty="0"/>
-              <a:t>: </a:t>
-            </a:r>
-            <a:r>
-              <a:rPr lang="en-US" dirty="0" err="1"/>
-              <a:t>Common.FortuneType.Good</a:t>
-            </a:r>
-            <a:r>
-              <a:rPr lang="en-US" dirty="0"/>
-              <a:t>, fortune: ‘Everything will happen the way you want it to’},</a:t>
-            </a:r>
-          </a:p>
-          <a:p>
-            <a:pPr marL="0" indent="0">
-              <a:buNone/>
-            </a:pPr>
-            <a:r>
-              <a:rPr lang="en-US" dirty="0"/>
-              <a:t>{</a:t>
-            </a:r>
-            <a:r>
-              <a:rPr lang="en-US" dirty="0" err="1"/>
-              <a:t>fortuneType</a:t>
-            </a:r>
-            <a:r>
-              <a:rPr lang="en-US" dirty="0"/>
-              <a:t>: </a:t>
-            </a:r>
-            <a:r>
-              <a:rPr lang="en-US" dirty="0" err="1"/>
-              <a:t>Common.FortuneType.Bad</a:t>
-            </a:r>
-            <a:r>
-              <a:rPr lang="en-US" dirty="0"/>
-              <a:t>, fortune: ‘Your nemesis will get everything they want’},</a:t>
-            </a:r>
-          </a:p>
-          <a:p>
-            <a:pPr marL="0" indent="0">
-              <a:buNone/>
-            </a:pPr>
-            <a:r>
-              <a:rPr lang="en-US" dirty="0"/>
-              <a:t>{</a:t>
-            </a:r>
-            <a:r>
-              <a:rPr lang="en-US" dirty="0" err="1"/>
-              <a:t>fortuneType</a:t>
-            </a:r>
-            <a:r>
-              <a:rPr lang="en-US" dirty="0"/>
-              <a:t>: </a:t>
-            </a:r>
-            <a:r>
-              <a:rPr lang="en-US" dirty="0" err="1"/>
-              <a:t>Common.FortuneType.Neutral</a:t>
-            </a:r>
-            <a:r>
-              <a:rPr lang="en-US" dirty="0"/>
-              <a:t>, </a:t>
-            </a:r>
-          </a:p>
-          <a:p>
-            <a:pPr marL="0" indent="0">
-              <a:buNone/>
-            </a:pPr>
-            <a:r>
-              <a:rPr lang="en-US" dirty="0"/>
-              <a:t>fortune: ‘It won’t be super memorable’ +</a:t>
-            </a:r>
-          </a:p>
-          <a:p>
-            <a:pPr marL="0" indent="0">
-              <a:buNone/>
-            </a:pPr>
-            <a:r>
-              <a:rPr lang="en-US" dirty="0"/>
-              <a:t>‘In a good or bad way’}</a:t>
-            </a:r>
-          </a:p>
-          <a:p>
-            <a:pPr marL="0" indent="0">
-              <a:buNone/>
-            </a:pPr>
-            <a:r>
-              <a:rPr lang="en-US" dirty="0"/>
-              <a:t>];</a:t>
-            </a:r>
-          </a:p>
-          <a:p>
-            <a:pPr marL="0" indent="0">
-              <a:buNone/>
-            </a:pPr>
-            <a:endParaRPr lang="en-US" dirty="0"/>
+          <a:bodyPr/>
+          <a:lstStyle/>
+          <a:p>
+            <a:r>
+              <a:rPr lang="en-US" dirty="0"/>
+              <a:t>If we always got the same fortune it would be pretty boring right. </a:t>
+            </a:r>
           </a:p>
         </p:txBody>
       </p:sp>
     </p:spTree>
     <p:extLst>
       <p:ext uri="{BB962C8B-B14F-4D97-AF65-F5344CB8AC3E}">
-        <p14:creationId xmlns:p14="http://schemas.microsoft.com/office/powerpoint/2010/main" val="2520169800"/>
+        <p14:creationId xmlns:p14="http://schemas.microsoft.com/office/powerpoint/2010/main" val="2129822467"/>
       </p:ext>
     </p:extLst>
   </p:cSld>
@@ -8527,7 +8321,7 @@
           <p:cNvPr id="2" name="Title 1">
             <a:extLst>
               <a:ext uri="{FF2B5EF4-FFF2-40B4-BE49-F238E27FC236}">
-                <a16:creationId xmlns:a16="http://schemas.microsoft.com/office/drawing/2014/main" id="{DAE61340-EB0C-43F4-82F8-3A55E83D0AAA}"/>
+                <a16:creationId xmlns:a16="http://schemas.microsoft.com/office/drawing/2014/main" id="{D996E0CC-5C4A-4057-9BF4-532E2E1D58AB}"/>
               </a:ext>
             </a:extLst>
           </p:cNvPr>
@@ -8540,12 +8334,21 @@
         </p:nvSpPr>
         <p:spPr/>
         <p:txBody>
-          <a:bodyPr/>
-          <a:lstStyle/>
-          <a:p>
-            <a:r>
-              <a:rPr lang="en-US" dirty="0"/>
-              <a:t>So how do we get a fortune?</a:t>
+          <a:bodyPr>
+            <a:normAutofit/>
+          </a:bodyPr>
+          <a:lstStyle/>
+          <a:p>
+            <a:r>
+              <a:rPr lang="en-US" dirty="0"/>
+              <a:t>Now let’s make choosing a fortune random. </a:t>
+            </a:r>
+            <a:br>
+              <a:rPr lang="en-US" dirty="0"/>
+            </a:br>
+            <a:r>
+              <a:rPr lang="en-US" dirty="0"/>
+              <a:t>But first, let’s talk a bit about what’s going on</a:t>
             </a:r>
           </a:p>
         </p:txBody>
@@ -8555,7 +8358,7 @@
           <p:cNvPr id="3" name="Content Placeholder 2">
             <a:extLst>
               <a:ext uri="{FF2B5EF4-FFF2-40B4-BE49-F238E27FC236}">
-                <a16:creationId xmlns:a16="http://schemas.microsoft.com/office/drawing/2014/main" id="{55569AA9-4759-411B-8203-AA4685AF3F0C}"/>
+                <a16:creationId xmlns:a16="http://schemas.microsoft.com/office/drawing/2014/main" id="{95F3BC07-8380-4FB5-86BC-29F371486361}"/>
               </a:ext>
             </a:extLst>
           </p:cNvPr>
@@ -8568,20 +8371,220 @@
         </p:nvSpPr>
         <p:spPr/>
         <p:txBody>
-          <a:bodyPr/>
-          <a:lstStyle/>
-          <a:p>
-            <a:r>
-              <a:rPr lang="en-US" dirty="0"/>
-              <a:t>If we always got the same fortune it would be pretty boring right. </a:t>
-            </a:r>
+          <a:bodyPr>
+            <a:normAutofit fontScale="55000" lnSpcReduction="20000"/>
+          </a:bodyPr>
+          <a:lstStyle/>
+          <a:p>
+            <a:r>
+              <a:rPr lang="en-US" dirty="0"/>
+              <a:t>Constructor:</a:t>
+            </a:r>
+          </a:p>
+          <a:p>
+            <a:pPr marL="0" indent="0">
+              <a:buNone/>
+            </a:pPr>
+            <a:r>
+              <a:rPr lang="en-US" dirty="0"/>
+              <a:t>constructor (props: {}, state: {}) {</a:t>
+            </a:r>
+          </a:p>
+          <a:p>
+            <a:pPr marL="0" indent="0">
+              <a:buNone/>
+            </a:pPr>
+            <a:r>
+              <a:rPr lang="en-US" dirty="0"/>
+              <a:t>super(props);</a:t>
+            </a:r>
+          </a:p>
+          <a:p>
+            <a:pPr marL="0" indent="0">
+              <a:buNone/>
+            </a:pPr>
+            <a:r>
+              <a:rPr lang="en-US" dirty="0" err="1"/>
+              <a:t>this.GetFortune</a:t>
+            </a:r>
+            <a:r>
+              <a:rPr lang="en-US" dirty="0"/>
+              <a:t> = </a:t>
+            </a:r>
+            <a:r>
+              <a:rPr lang="en-US" dirty="0" err="1"/>
+              <a:t>this.GetFortune.bind</a:t>
+            </a:r>
+            <a:r>
+              <a:rPr lang="en-US" dirty="0"/>
+              <a:t>(this);</a:t>
+            </a:r>
+          </a:p>
+          <a:p>
+            <a:pPr marL="0" indent="0">
+              <a:buNone/>
+            </a:pPr>
+            <a:r>
+              <a:rPr lang="en-US" dirty="0"/>
+              <a:t>}</a:t>
+            </a:r>
+          </a:p>
+          <a:p>
+            <a:r>
+              <a:rPr lang="en-US" dirty="0" err="1"/>
+              <a:t>GetFortune</a:t>
+            </a:r>
+            <a:r>
+              <a:rPr lang="en-US" dirty="0"/>
+              <a:t>() {</a:t>
+            </a:r>
+          </a:p>
+          <a:p>
+            <a:pPr marL="0" indent="0">
+              <a:buNone/>
+            </a:pPr>
+            <a:r>
+              <a:rPr lang="en-US" dirty="0"/>
+              <a:t>/*let fortunes: </a:t>
+            </a:r>
+            <a:r>
+              <a:rPr lang="en-US" dirty="0" err="1"/>
+              <a:t>Common.Fortune</a:t>
+            </a:r>
+            <a:r>
+              <a:rPr lang="en-US" dirty="0"/>
+              <a:t>[] = [</a:t>
+            </a:r>
+          </a:p>
+          <a:p>
+            <a:pPr marL="0" indent="0">
+              <a:buNone/>
+            </a:pPr>
+            <a:r>
+              <a:rPr lang="en-US" dirty="0"/>
+              <a:t>{</a:t>
+            </a:r>
+            <a:r>
+              <a:rPr lang="en-US" dirty="0" err="1"/>
+              <a:t>fortuneType</a:t>
+            </a:r>
+            <a:r>
+              <a:rPr lang="en-US" dirty="0"/>
+              <a:t>: </a:t>
+            </a:r>
+            <a:r>
+              <a:rPr lang="en-US" dirty="0" err="1"/>
+              <a:t>Common.FortuneType.Good</a:t>
+            </a:r>
+            <a:r>
+              <a:rPr lang="en-US" dirty="0"/>
+              <a:t>, fortune: 'Everything will happen the way you want it to'},</a:t>
+            </a:r>
+          </a:p>
+          <a:p>
+            <a:pPr marL="0" indent="0">
+              <a:buNone/>
+            </a:pPr>
+            <a:r>
+              <a:rPr lang="en-US" dirty="0"/>
+              <a:t>{</a:t>
+            </a:r>
+            <a:r>
+              <a:rPr lang="en-US" dirty="0" err="1"/>
+              <a:t>fortuneType</a:t>
+            </a:r>
+            <a:r>
+              <a:rPr lang="en-US" dirty="0"/>
+              <a:t>: </a:t>
+            </a:r>
+            <a:r>
+              <a:rPr lang="en-US" dirty="0" err="1"/>
+              <a:t>Common.FortuneType.Bad</a:t>
+            </a:r>
+            <a:r>
+              <a:rPr lang="en-US" dirty="0"/>
+              <a:t>, fortune: 'Your nemesis will get everything they want'},</a:t>
+            </a:r>
+          </a:p>
+          <a:p>
+            <a:pPr marL="0" indent="0">
+              <a:buNone/>
+            </a:pPr>
+            <a:r>
+              <a:rPr lang="en-US" dirty="0"/>
+              <a:t>{</a:t>
+            </a:r>
+            <a:r>
+              <a:rPr lang="en-US" dirty="0" err="1"/>
+              <a:t>fortuneType</a:t>
+            </a:r>
+            <a:r>
+              <a:rPr lang="en-US" dirty="0"/>
+              <a:t>: </a:t>
+            </a:r>
+            <a:r>
+              <a:rPr lang="en-US" dirty="0" err="1"/>
+              <a:t>Common.FortuneType.Neutral</a:t>
+            </a:r>
+            <a:r>
+              <a:rPr lang="en-US" dirty="0"/>
+              <a:t>, </a:t>
+            </a:r>
+          </a:p>
+          <a:p>
+            <a:pPr marL="0" indent="0">
+              <a:buNone/>
+            </a:pPr>
+            <a:r>
+              <a:rPr lang="en-US" dirty="0"/>
+              <a:t>fortune: 'It won’t be super memorable' +</a:t>
+            </a:r>
+          </a:p>
+          <a:p>
+            <a:pPr marL="0" indent="0">
+              <a:buNone/>
+            </a:pPr>
+            <a:r>
+              <a:rPr lang="en-US" dirty="0"/>
+              <a:t>'In a good or bad way’}</a:t>
+            </a:r>
+          </a:p>
+          <a:p>
+            <a:pPr marL="0" indent="0">
+              <a:buNone/>
+            </a:pPr>
+            <a:r>
+              <a:rPr lang="en-US" dirty="0"/>
+              <a:t>];</a:t>
+            </a:r>
+          </a:p>
+          <a:p>
+            <a:pPr marL="0" indent="0">
+              <a:buNone/>
+            </a:pPr>
+            <a:r>
+              <a:rPr lang="en-US" dirty="0"/>
+              <a:t>}</a:t>
+            </a:r>
+          </a:p>
+          <a:p>
+            <a:pPr marL="0" indent="0">
+              <a:buNone/>
+            </a:pPr>
+            <a:endParaRPr lang="en-US" dirty="0"/>
+          </a:p>
+          <a:p>
+            <a:pPr marL="457200" lvl="1" indent="0">
+              <a:buNone/>
+            </a:pPr>
+            <a:endParaRPr lang="en-US" dirty="0"/>
           </a:p>
         </p:txBody>
       </p:sp>
     </p:spTree>
     <p:extLst>
       <p:ext uri="{BB962C8B-B14F-4D97-AF65-F5344CB8AC3E}">
-        <p14:creationId xmlns:p14="http://schemas.microsoft.com/office/powerpoint/2010/main" val="2129822467"/>
+        <p14:creationId xmlns:p14="http://schemas.microsoft.com/office/powerpoint/2010/main" val="1762204865"/>
       </p:ext>
     </p:extLst>
   </p:cSld>
@@ -8613,7 +8616,7 @@
           <p:cNvPr id="2" name="Title 1">
             <a:extLst>
               <a:ext uri="{FF2B5EF4-FFF2-40B4-BE49-F238E27FC236}">
-                <a16:creationId xmlns:a16="http://schemas.microsoft.com/office/drawing/2014/main" id="{D996E0CC-5C4A-4057-9BF4-532E2E1D58AB}"/>
+                <a16:creationId xmlns:a16="http://schemas.microsoft.com/office/drawing/2014/main" id="{43499C28-6516-433C-B3C5-38E9835C5EC5}"/>
               </a:ext>
             </a:extLst>
           </p:cNvPr>
@@ -8626,21 +8629,12 @@
         </p:nvSpPr>
         <p:spPr/>
         <p:txBody>
-          <a:bodyPr>
-            <a:normAutofit/>
-          </a:bodyPr>
-          <a:lstStyle/>
-          <a:p>
-            <a:r>
-              <a:rPr lang="en-US" dirty="0"/>
-              <a:t>Now let’s make choosing a fortune random. </a:t>
-            </a:r>
-            <a:br>
-              <a:rPr lang="en-US" dirty="0"/>
-            </a:br>
-            <a:r>
-              <a:rPr lang="en-US" dirty="0"/>
-              <a:t>But first, let’s talk a bit about what’s going on</a:t>
+          <a:bodyPr/>
+          <a:lstStyle/>
+          <a:p>
+            <a:r>
+              <a:rPr lang="en-US" dirty="0"/>
+              <a:t>Time to randomly chose a number based on the number of fortunes you created:</a:t>
             </a:r>
           </a:p>
         </p:txBody>
@@ -8650,7 +8644,7 @@
           <p:cNvPr id="3" name="Content Placeholder 2">
             <a:extLst>
               <a:ext uri="{FF2B5EF4-FFF2-40B4-BE49-F238E27FC236}">
-                <a16:creationId xmlns:a16="http://schemas.microsoft.com/office/drawing/2014/main" id="{95F3BC07-8380-4FB5-86BC-29F371486361}"/>
+                <a16:creationId xmlns:a16="http://schemas.microsoft.com/office/drawing/2014/main" id="{C3F136AB-B48C-459A-B646-A6E61500636E}"/>
               </a:ext>
             </a:extLst>
           </p:cNvPr>
@@ -8663,14 +8657,20 @@
         </p:nvSpPr>
         <p:spPr/>
         <p:txBody>
-          <a:bodyPr>
-            <a:normAutofit fontScale="55000" lnSpcReduction="20000"/>
-          </a:bodyPr>
-          <a:lstStyle/>
-          <a:p>
-            <a:r>
-              <a:rPr lang="en-US" dirty="0"/>
-              <a:t>Constructor:</a:t>
+          <a:bodyPr/>
+          <a:lstStyle/>
+          <a:p>
+            <a:r>
+              <a:rPr lang="en-US" dirty="0"/>
+              <a:t>Add this into your “</a:t>
+            </a:r>
+            <a:r>
+              <a:rPr lang="en-US" dirty="0" err="1"/>
+              <a:t>GetFortunes</a:t>
+            </a:r>
+            <a:r>
+              <a:rPr lang="en-US" dirty="0"/>
+              <a:t>” Function</a:t>
             </a:r>
           </a:p>
           <a:p>
@@ -8679,8 +8679,33 @@
             </a:pPr>
             <a:r>
               <a:rPr lang="en-US" dirty="0"/>
-              <a:t>constructor (props: {}, state: {}) {</a:t>
-            </a:r>
+              <a:t>	return fortunes[(</a:t>
+            </a:r>
+            <a:r>
+              <a:rPr lang="en-US" dirty="0" err="1"/>
+              <a:t>Math.floor</a:t>
+            </a:r>
+            <a:r>
+              <a:rPr lang="en-US" dirty="0"/>
+              <a:t>(</a:t>
+            </a:r>
+            <a:r>
+              <a:rPr lang="en-US" dirty="0" err="1"/>
+              <a:t>Math.random</a:t>
+            </a:r>
+            <a:r>
+              <a:rPr lang="en-US" dirty="0"/>
+              <a:t>() * </a:t>
+            </a:r>
+            <a:r>
+              <a:rPr lang="en-US" dirty="0" err="1"/>
+              <a:t>fortunes.length</a:t>
+            </a:r>
+            <a:r>
+              <a:rPr lang="en-US"/>
+              <a:t>)]</a:t>
+            </a:r>
+            <a:endParaRPr lang="en-US" dirty="0"/>
           </a:p>
           <a:p>
             <a:pPr marL="0" indent="0">
@@ -8688,195 +8713,35 @@
             </a:pPr>
             <a:r>
               <a:rPr lang="en-US" dirty="0"/>
-              <a:t>super(props);</a:t>
-            </a:r>
-          </a:p>
-          <a:p>
-            <a:pPr marL="0" indent="0">
-              <a:buNone/>
-            </a:pPr>
+              <a:t>;</a:t>
+            </a:r>
+          </a:p>
+          <a:p>
+            <a:r>
+              <a:rPr lang="en-US" dirty="0"/>
+              <a:t>What do you think </a:t>
+            </a:r>
             <a:r>
               <a:rPr lang="en-US" dirty="0" err="1"/>
-              <a:t>this.GetFortune</a:t>
-            </a:r>
-            <a:r>
-              <a:rPr lang="en-US" dirty="0"/>
-              <a:t> = </a:t>
-            </a:r>
-            <a:r>
-              <a:rPr lang="en-US" dirty="0" err="1"/>
-              <a:t>this.GetFortune.bind</a:t>
-            </a:r>
-            <a:r>
-              <a:rPr lang="en-US" dirty="0"/>
-              <a:t>(this);</a:t>
-            </a:r>
-          </a:p>
-          <a:p>
-            <a:pPr marL="0" indent="0">
-              <a:buNone/>
-            </a:pPr>
-            <a:r>
-              <a:rPr lang="en-US" dirty="0"/>
-              <a:t>}</a:t>
-            </a:r>
-          </a:p>
-          <a:p>
-            <a:r>
-              <a:rPr lang="en-US" dirty="0" err="1"/>
-              <a:t>GetFortune</a:t>
-            </a:r>
-            <a:r>
-              <a:rPr lang="en-US" dirty="0"/>
-              <a:t>() {</a:t>
-            </a:r>
-          </a:p>
-          <a:p>
-            <a:pPr marL="0" indent="0">
-              <a:buNone/>
-            </a:pPr>
-            <a:r>
-              <a:rPr lang="en-US" dirty="0"/>
-              <a:t>/*let fortunes: </a:t>
-            </a:r>
-            <a:r>
-              <a:rPr lang="en-US" dirty="0" err="1"/>
-              <a:t>Common.Fortune</a:t>
-            </a:r>
-            <a:r>
-              <a:rPr lang="en-US" dirty="0"/>
-              <a:t>[] = [</a:t>
-            </a:r>
-          </a:p>
-          <a:p>
-            <a:pPr marL="0" indent="0">
-              <a:buNone/>
-            </a:pPr>
-            <a:r>
-              <a:rPr lang="en-US" dirty="0"/>
-              <a:t>{</a:t>
-            </a:r>
-            <a:r>
-              <a:rPr lang="en-US" dirty="0" err="1"/>
-              <a:t>fortuneType</a:t>
-            </a:r>
-            <a:r>
-              <a:rPr lang="en-US" dirty="0"/>
-              <a:t>: </a:t>
-            </a:r>
-            <a:r>
-              <a:rPr lang="en-US" dirty="0" err="1"/>
-              <a:t>Common.FortuneType.Good</a:t>
-            </a:r>
-            <a:r>
-              <a:rPr lang="en-US" dirty="0"/>
-              <a:t>, fortune: 'Everything will happen the way you want it to'},</a:t>
-            </a:r>
-          </a:p>
-          <a:p>
-            <a:pPr marL="0" indent="0">
-              <a:buNone/>
-            </a:pPr>
-            <a:r>
-              <a:rPr lang="en-US" dirty="0"/>
-              <a:t>{</a:t>
-            </a:r>
-            <a:r>
-              <a:rPr lang="en-US" dirty="0" err="1"/>
-              <a:t>fortuneType</a:t>
-            </a:r>
-            <a:r>
-              <a:rPr lang="en-US" dirty="0"/>
-              <a:t>: </a:t>
-            </a:r>
-            <a:r>
-              <a:rPr lang="en-US" dirty="0" err="1"/>
-              <a:t>Common.FortuneType.Bad</a:t>
-            </a:r>
-            <a:r>
-              <a:rPr lang="en-US" dirty="0"/>
-              <a:t>, fortune: 'Your nemesis will get everything they want'},</a:t>
-            </a:r>
-          </a:p>
-          <a:p>
-            <a:pPr marL="0" indent="0">
-              <a:buNone/>
-            </a:pPr>
-            <a:r>
-              <a:rPr lang="en-US" dirty="0"/>
-              <a:t>{</a:t>
-            </a:r>
-            <a:r>
-              <a:rPr lang="en-US" dirty="0" err="1"/>
-              <a:t>fortuneType</a:t>
-            </a:r>
-            <a:r>
-              <a:rPr lang="en-US" dirty="0"/>
-              <a:t>: </a:t>
-            </a:r>
-            <a:r>
-              <a:rPr lang="en-US" dirty="0" err="1"/>
-              <a:t>Common.FortuneType.Neutral</a:t>
-            </a:r>
-            <a:r>
-              <a:rPr lang="en-US" dirty="0"/>
-              <a:t>, </a:t>
-            </a:r>
-          </a:p>
-          <a:p>
-            <a:pPr marL="0" indent="0">
-              <a:buNone/>
-            </a:pPr>
-            <a:r>
-              <a:rPr lang="en-US" dirty="0"/>
-              <a:t>fortune: 'It won’t be super memorable' +</a:t>
-            </a:r>
-          </a:p>
-          <a:p>
-            <a:pPr marL="0" indent="0">
-              <a:buNone/>
-            </a:pPr>
-            <a:r>
-              <a:rPr lang="en-US" dirty="0"/>
-              <a:t>'In a good or bad way’}</a:t>
-            </a:r>
-          </a:p>
-          <a:p>
-            <a:pPr marL="0" indent="0">
-              <a:buNone/>
-            </a:pPr>
-            <a:r>
-              <a:rPr lang="en-US" dirty="0"/>
-              <a:t>];</a:t>
-            </a:r>
-          </a:p>
-          <a:p>
-            <a:pPr marL="0" indent="0">
-              <a:buNone/>
-            </a:pPr>
-            <a:r>
-              <a:rPr lang="en-US" dirty="0"/>
-              <a:t>}</a:t>
-            </a:r>
-          </a:p>
-          <a:p>
-            <a:pPr marL="0" indent="0">
-              <a:buNone/>
-            </a:pPr>
-            <a:endParaRPr lang="en-US" dirty="0"/>
-          </a:p>
-          <a:p>
-            <a:pPr marL="457200" lvl="1" indent="0">
-              <a:buNone/>
-            </a:pPr>
-            <a:endParaRPr lang="en-US" dirty="0"/>
+              <a:t>fortunes.length</a:t>
+            </a:r>
+            <a:r>
+              <a:rPr lang="en-US" dirty="0"/>
+              <a:t> does?</a:t>
+            </a:r>
+          </a:p>
+          <a:p>
+            <a:r>
+              <a:rPr lang="en-US" dirty="0"/>
+              <a:t>Why “-1”</a:t>
+            </a:r>
           </a:p>
         </p:txBody>
       </p:sp>
     </p:spTree>
     <p:extLst>
       <p:ext uri="{BB962C8B-B14F-4D97-AF65-F5344CB8AC3E}">
-        <p14:creationId xmlns:p14="http://schemas.microsoft.com/office/powerpoint/2010/main" val="1762204865"/>
+        <p14:creationId xmlns:p14="http://schemas.microsoft.com/office/powerpoint/2010/main" val="4011342571"/>
       </p:ext>
     </p:extLst>
   </p:cSld>
@@ -8908,7 +8773,7 @@
           <p:cNvPr id="2" name="Title 1">
             <a:extLst>
               <a:ext uri="{FF2B5EF4-FFF2-40B4-BE49-F238E27FC236}">
-                <a16:creationId xmlns:a16="http://schemas.microsoft.com/office/drawing/2014/main" id="{43499C28-6516-433C-B3C5-38E9835C5EC5}"/>
+                <a16:creationId xmlns:a16="http://schemas.microsoft.com/office/drawing/2014/main" id="{35DD3BCE-9407-4739-920E-30CFAB084B74}"/>
               </a:ext>
             </a:extLst>
           </p:cNvPr>
@@ -8926,7 +8791,7 @@
           <a:p>
             <a:r>
               <a:rPr lang="en-US" dirty="0"/>
-              <a:t>Time to randomly chose a number based on the number of fortunes you created:</a:t>
+              <a:t>Hooray! We can get a fortune!</a:t>
             </a:r>
           </a:p>
         </p:txBody>
@@ -8936,7 +8801,7 @@
           <p:cNvPr id="3" name="Content Placeholder 2">
             <a:extLst>
               <a:ext uri="{FF2B5EF4-FFF2-40B4-BE49-F238E27FC236}">
-                <a16:creationId xmlns:a16="http://schemas.microsoft.com/office/drawing/2014/main" id="{C3F136AB-B48C-459A-B646-A6E61500636E}"/>
+                <a16:creationId xmlns:a16="http://schemas.microsoft.com/office/drawing/2014/main" id="{7B667B5B-9083-43AE-99BA-BD3A258AE00F}"/>
               </a:ext>
             </a:extLst>
           </p:cNvPr>
@@ -8954,15 +8819,46 @@
           <a:p>
             <a:r>
               <a:rPr lang="en-US" dirty="0"/>
-              <a:t>Add this into your “</a:t>
+              <a:t>Add this to the top of your render in your </a:t>
             </a:r>
             <a:r>
               <a:rPr lang="en-US" dirty="0" err="1"/>
-              <a:t>GetFortunes</a:t>
-            </a:r>
-            <a:r>
-              <a:rPr lang="en-US" dirty="0"/>
-              <a:t>” Function</a:t>
+              <a:t>fortune.tsx</a:t>
+            </a:r>
+            <a:r>
+              <a:rPr lang="en-US" dirty="0"/>
+              <a:t>:</a:t>
+            </a:r>
+          </a:p>
+          <a:p>
+            <a:pPr marL="457200" lvl="1" indent="0">
+              <a:buNone/>
+            </a:pPr>
+            <a:r>
+              <a:rPr lang="en-US" dirty="0"/>
+              <a:t>let fortune = </a:t>
+            </a:r>
+            <a:r>
+              <a:rPr lang="en-US" dirty="0" err="1"/>
+              <a:t>this.GetFortune</a:t>
+            </a:r>
+            <a:r>
+              <a:rPr lang="en-US" dirty="0"/>
+              <a:t>();</a:t>
+            </a:r>
+          </a:p>
+          <a:p>
+            <a:r>
+              <a:rPr lang="en-US" dirty="0"/>
+              <a:t>Now, lets use our fortune to display instead- </a:t>
+            </a:r>
+            <a:r>
+              <a:rPr lang="en-US" dirty="0" err="1"/>
+              <a:t>fortune.tsx</a:t>
+            </a:r>
+            <a:r>
+              <a:rPr lang="en-US" dirty="0"/>
+              <a:t>:</a:t>
             </a:r>
           </a:p>
           <a:p>
@@ -8971,59 +8867,41 @@
             </a:pPr>
             <a:r>
               <a:rPr lang="en-US" dirty="0"/>
-              <a:t>	return fortunes[(</a:t>
+              <a:t>&lt;big style={style} </a:t>
             </a:r>
             <a:r>
               <a:rPr lang="en-US" dirty="0" err="1"/>
-              <a:t>Math.round</a:t>
-            </a:r>
-            <a:r>
-              <a:rPr lang="en-US" dirty="0"/>
-              <a:t>(</a:t>
+              <a:t>className</a:t>
+            </a:r>
+            <a:r>
+              <a:rPr lang="en-US" dirty="0"/>
+              <a:t>="Fortune-text"&gt; Your fortune is {</a:t>
             </a:r>
             <a:r>
               <a:rPr lang="en-US" dirty="0" err="1"/>
-              <a:t>Math.random</a:t>
-            </a:r>
-            <a:r>
-              <a:rPr lang="en-US" dirty="0"/>
-              <a:t>() * </a:t>
-            </a:r>
-            <a:r>
-              <a:rPr lang="en-US" dirty="0" err="1"/>
-              <a:t>fortunes.length</a:t>
-            </a:r>
-            <a:r>
-              <a:rPr lang="en-US" dirty="0"/>
-              <a:t> - 1))];</a:t>
-            </a:r>
-          </a:p>
-          <a:p>
-            <a:r>
-              <a:rPr lang="en-US" dirty="0"/>
-              <a:t>What do you think </a:t>
-            </a:r>
-            <a:r>
-              <a:rPr lang="en-US" dirty="0" err="1"/>
-              <a:t>fortunes.length</a:t>
-            </a:r>
-            <a:r>
-              <a:rPr lang="en-US" dirty="0"/>
-              <a:t> does?</a:t>
-            </a:r>
-          </a:p>
-          <a:p>
-            <a:r>
-              <a:rPr lang="en-US" dirty="0"/>
-              <a:t>Why “-1”</a:t>
-            </a:r>
+              <a:t>fortune.fortune</a:t>
+            </a:r>
+            <a:r>
+              <a:rPr lang="en-US" dirty="0"/>
+              <a:t>}&lt;/big&gt;</a:t>
+            </a:r>
+          </a:p>
+          <a:p>
+            <a:pPr marL="457200" lvl="1" indent="0">
+              <a:buNone/>
+            </a:pPr>
+            <a:endParaRPr lang="en-US" dirty="0"/>
+          </a:p>
+          <a:p>
+            <a:pPr lvl="1"/>
+            <a:endParaRPr lang="en-US" dirty="0"/>
           </a:p>
         </p:txBody>
       </p:sp>
     </p:spTree>
     <p:extLst>
       <p:ext uri="{BB962C8B-B14F-4D97-AF65-F5344CB8AC3E}">
-        <p14:creationId xmlns:p14="http://schemas.microsoft.com/office/powerpoint/2010/main" val="4011342571"/>
+        <p14:creationId xmlns:p14="http://schemas.microsoft.com/office/powerpoint/2010/main" val="3963217686"/>
       </p:ext>
     </p:extLst>
   </p:cSld>
@@ -9055,7 +8933,7 @@
           <p:cNvPr id="2" name="Title 1">
             <a:extLst>
               <a:ext uri="{FF2B5EF4-FFF2-40B4-BE49-F238E27FC236}">
-                <a16:creationId xmlns:a16="http://schemas.microsoft.com/office/drawing/2014/main" id="{35DD3BCE-9407-4739-920E-30CFAB084B74}"/>
+                <a16:creationId xmlns:a16="http://schemas.microsoft.com/office/drawing/2014/main" id="{BD61B9A8-15CD-42A8-AA86-F6FAD5A6BEBE}"/>
               </a:ext>
             </a:extLst>
           </p:cNvPr>
@@ -9073,7 +8951,7 @@
           <a:p>
             <a:r>
               <a:rPr lang="en-US" dirty="0"/>
-              <a:t>Hooray! We can get a fortune!</a:t>
+              <a:t>Style our fortune!</a:t>
             </a:r>
           </a:p>
         </p:txBody>
@@ -9083,7 +8961,7 @@
           <p:cNvPr id="3" name="Content Placeholder 2">
             <a:extLst>
               <a:ext uri="{FF2B5EF4-FFF2-40B4-BE49-F238E27FC236}">
-                <a16:creationId xmlns:a16="http://schemas.microsoft.com/office/drawing/2014/main" id="{7B667B5B-9083-43AE-99BA-BD3A258AE00F}"/>
+                <a16:creationId xmlns:a16="http://schemas.microsoft.com/office/drawing/2014/main" id="{A29C7F98-9279-433D-BF08-A7EC9DCDFCD8}"/>
               </a:ext>
             </a:extLst>
           </p:cNvPr>
@@ -9099,83 +8977,6 @@
           <a:bodyPr/>
           <a:lstStyle/>
           <a:p>
-            <a:r>
-              <a:rPr lang="en-US" dirty="0"/>
-              <a:t>Add this to the top of your render in your </a:t>
-            </a:r>
-            <a:r>
-              <a:rPr lang="en-US" dirty="0" err="1"/>
-              <a:t>fortune.tsx</a:t>
-            </a:r>
-            <a:r>
-              <a:rPr lang="en-US" dirty="0"/>
-              <a:t>:</a:t>
-            </a:r>
-          </a:p>
-          <a:p>
-            <a:pPr marL="457200" lvl="1" indent="0">
-              <a:buNone/>
-            </a:pPr>
-            <a:r>
-              <a:rPr lang="en-US" dirty="0"/>
-              <a:t>let fortune = </a:t>
-            </a:r>
-            <a:r>
-              <a:rPr lang="en-US" dirty="0" err="1"/>
-              <a:t>this.GetFortune</a:t>
-            </a:r>
-            <a:r>
-              <a:rPr lang="en-US" dirty="0"/>
-              <a:t>();</a:t>
-            </a:r>
-          </a:p>
-          <a:p>
-            <a:r>
-              <a:rPr lang="en-US" dirty="0"/>
-              <a:t>Now, lets use our fortune to display instead- </a:t>
-            </a:r>
-            <a:r>
-              <a:rPr lang="en-US" dirty="0" err="1"/>
-              <a:t>fortune.tsx</a:t>
-            </a:r>
-            <a:r>
-              <a:rPr lang="en-US" dirty="0"/>
-              <a:t>:</a:t>
-            </a:r>
-          </a:p>
-          <a:p>
-            <a:pPr marL="0" indent="0">
-              <a:buNone/>
-            </a:pPr>
-            <a:r>
-              <a:rPr lang="en-US" dirty="0"/>
-              <a:t>&lt;big style={style} </a:t>
-            </a:r>
-            <a:r>
-              <a:rPr lang="en-US" dirty="0" err="1"/>
-              <a:t>className</a:t>
-            </a:r>
-            <a:r>
-              <a:rPr lang="en-US" dirty="0"/>
-              <a:t>="Fortune-text"&gt; Your fortune is {</a:t>
-            </a:r>
-            <a:r>
-              <a:rPr lang="en-US" dirty="0" err="1"/>
-              <a:t>fortune.fortune</a:t>
-            </a:r>
-            <a:r>
-              <a:rPr lang="en-US" dirty="0"/>
-              <a:t>}&lt;/big&gt;</a:t>
-            </a:r>
-          </a:p>
-          <a:p>
-            <a:pPr marL="457200" lvl="1" indent="0">
-              <a:buNone/>
-            </a:pPr>
-            <a:endParaRPr lang="en-US" dirty="0"/>
-          </a:p>
-          <a:p>
-            <a:pPr lvl="1"/>
             <a:endParaRPr lang="en-US" dirty="0"/>
           </a:p>
         </p:txBody>
@@ -9183,7 +8984,7 @@
     </p:spTree>
     <p:extLst>
       <p:ext uri="{BB962C8B-B14F-4D97-AF65-F5344CB8AC3E}">
-        <p14:creationId xmlns:p14="http://schemas.microsoft.com/office/powerpoint/2010/main" val="3963217686"/>
+        <p14:creationId xmlns:p14="http://schemas.microsoft.com/office/powerpoint/2010/main" val="1893109201"/>
       </p:ext>
     </p:extLst>
   </p:cSld>
@@ -9215,7 +9016,7 @@
           <p:cNvPr id="2" name="Title 1">
             <a:extLst>
               <a:ext uri="{FF2B5EF4-FFF2-40B4-BE49-F238E27FC236}">
-                <a16:creationId xmlns:a16="http://schemas.microsoft.com/office/drawing/2014/main" id="{BD61B9A8-15CD-42A8-AA86-F6FAD5A6BEBE}"/>
+                <a16:creationId xmlns:a16="http://schemas.microsoft.com/office/drawing/2014/main" id="{432D3FA2-E04B-4079-8C81-1BEF1CFB68D4}"/>
               </a:ext>
             </a:extLst>
           </p:cNvPr>
@@ -9233,7 +9034,7 @@
           <a:p>
             <a:r>
               <a:rPr lang="en-US" dirty="0"/>
-              <a:t>Style our fortune!</a:t>
+              <a:t>Wait… whats that style element </a:t>
             </a:r>
           </a:p>
         </p:txBody>
@@ -9243,7 +9044,7 @@
           <p:cNvPr id="3" name="Content Placeholder 2">
             <a:extLst>
               <a:ext uri="{FF2B5EF4-FFF2-40B4-BE49-F238E27FC236}">
-                <a16:creationId xmlns:a16="http://schemas.microsoft.com/office/drawing/2014/main" id="{A29C7F98-9279-433D-BF08-A7EC9DCDFCD8}"/>
+                <a16:creationId xmlns:a16="http://schemas.microsoft.com/office/drawing/2014/main" id="{478322B6-0339-455B-9BDC-B7F1F4BC6FDB}"/>
               </a:ext>
             </a:extLst>
           </p:cNvPr>
@@ -9256,9 +9057,129 @@
         </p:nvSpPr>
         <p:spPr/>
         <p:txBody>
-          <a:bodyPr/>
-          <a:lstStyle/>
-          <a:p>
+          <a:bodyPr>
+            <a:normAutofit fontScale="92500" lnSpcReduction="10000"/>
+          </a:bodyPr>
+          <a:lstStyle/>
+          <a:p>
+            <a:pPr marL="0" indent="0">
+              <a:buNone/>
+            </a:pPr>
+            <a:r>
+              <a:rPr lang="en-US" dirty="0"/>
+              <a:t>&lt;big </a:t>
+            </a:r>
+            <a:r>
+              <a:rPr lang="en-US" b="1" dirty="0">
+                <a:highlight>
+                  <a:srgbClr val="FFFF00"/>
+                </a:highlight>
+              </a:rPr>
+              <a:t>style={style} </a:t>
+            </a:r>
+            <a:r>
+              <a:rPr lang="en-US" dirty="0" err="1"/>
+              <a:t>className</a:t>
+            </a:r>
+            <a:r>
+              <a:rPr lang="en-US" dirty="0"/>
+              <a:t>="Fortune-text"&gt; Your fortune is {</a:t>
+            </a:r>
+            <a:r>
+              <a:rPr lang="en-US" dirty="0" err="1"/>
+              <a:t>fortune.fortune</a:t>
+            </a:r>
+            <a:r>
+              <a:rPr lang="en-US" dirty="0"/>
+              <a:t>}&lt;/big&gt;</a:t>
+            </a:r>
+          </a:p>
+          <a:p>
+            <a:pPr marL="0" indent="0">
+              <a:buNone/>
+            </a:pPr>
+            <a:endParaRPr lang="en-US" dirty="0"/>
+          </a:p>
+          <a:p>
+            <a:pPr marL="0" indent="0">
+              <a:buNone/>
+            </a:pPr>
+            <a:r>
+              <a:rPr lang="en-US" dirty="0"/>
+              <a:t>Remember how we talked about CSS? </a:t>
+            </a:r>
+          </a:p>
+          <a:p>
+            <a:pPr marL="0" indent="0">
+              <a:buNone/>
+            </a:pPr>
+            <a:r>
+              <a:rPr lang="en-US" dirty="0"/>
+              <a:t>We can make an </a:t>
+            </a:r>
+            <a:r>
+              <a:rPr lang="en-US" i="1" dirty="0"/>
+              <a:t>interface </a:t>
+            </a:r>
+            <a:r>
+              <a:rPr lang="en-US" dirty="0"/>
+              <a:t>about the style we want:</a:t>
+            </a:r>
+          </a:p>
+          <a:p>
+            <a:pPr marL="0" indent="0">
+              <a:buNone/>
+            </a:pPr>
+            <a:endParaRPr lang="en-US" dirty="0"/>
+          </a:p>
+          <a:p>
+            <a:pPr marL="0" indent="0">
+              <a:buNone/>
+            </a:pPr>
+            <a:r>
+              <a:rPr lang="en-US" dirty="0"/>
+              <a:t>interface Style {</a:t>
+            </a:r>
+          </a:p>
+          <a:p>
+            <a:pPr marL="0" indent="0">
+              <a:buNone/>
+            </a:pPr>
+            <a:r>
+              <a:rPr lang="en-US" dirty="0"/>
+              <a:t>	color: string;</a:t>
+            </a:r>
+          </a:p>
+          <a:p>
+            <a:pPr marL="0" indent="0">
+              <a:buNone/>
+            </a:pPr>
+            <a:r>
+              <a:rPr lang="en-US" dirty="0"/>
+              <a:t>	</a:t>
+            </a:r>
+            <a:r>
+              <a:rPr lang="en-US" dirty="0" err="1"/>
+              <a:t>fontWeight</a:t>
+            </a:r>
+            <a:r>
+              <a:rPr lang="en-US" dirty="0"/>
+              <a:t>: 'bold';</a:t>
+            </a:r>
+          </a:p>
+          <a:p>
+            <a:pPr marL="0" indent="0">
+              <a:buNone/>
+            </a:pPr>
+            <a:r>
+              <a:rPr lang="en-US" dirty="0"/>
+              <a:t>}</a:t>
+            </a:r>
+          </a:p>
+          <a:p>
+            <a:pPr marL="0" indent="0">
+              <a:buNone/>
+            </a:pPr>
             <a:endParaRPr lang="en-US" dirty="0"/>
           </a:p>
         </p:txBody>
@@ -9266,7 +9187,7 @@
     </p:spTree>
     <p:extLst>
       <p:ext uri="{BB962C8B-B14F-4D97-AF65-F5344CB8AC3E}">
-        <p14:creationId xmlns:p14="http://schemas.microsoft.com/office/powerpoint/2010/main" val="1893109201"/>
+        <p14:creationId xmlns:p14="http://schemas.microsoft.com/office/powerpoint/2010/main" val="2361844178"/>
       </p:ext>
     </p:extLst>
   </p:cSld>
@@ -9298,7 +9219,7 @@
           <p:cNvPr id="2" name="Title 1">
             <a:extLst>
               <a:ext uri="{FF2B5EF4-FFF2-40B4-BE49-F238E27FC236}">
-                <a16:creationId xmlns:a16="http://schemas.microsoft.com/office/drawing/2014/main" id="{432D3FA2-E04B-4079-8C81-1BEF1CFB68D4}"/>
+                <a16:creationId xmlns:a16="http://schemas.microsoft.com/office/drawing/2014/main" id="{D7F91FD0-460F-4705-892E-F02FFFBA173D}"/>
               </a:ext>
             </a:extLst>
           </p:cNvPr>
@@ -9316,7 +9237,7 @@
           <a:p>
             <a:r>
               <a:rPr lang="en-US" dirty="0"/>
-              <a:t>Wait… whats that style element </a:t>
+              <a:t>“Switch” – how we choose in computer science</a:t>
             </a:r>
           </a:p>
         </p:txBody>
@@ -9326,7 +9247,7 @@
           <p:cNvPr id="3" name="Content Placeholder 2">
             <a:extLst>
               <a:ext uri="{FF2B5EF4-FFF2-40B4-BE49-F238E27FC236}">
-                <a16:creationId xmlns:a16="http://schemas.microsoft.com/office/drawing/2014/main" id="{478322B6-0339-455B-9BDC-B7F1F4BC6FDB}"/>
+                <a16:creationId xmlns:a16="http://schemas.microsoft.com/office/drawing/2014/main" id="{BA08FCD2-AE02-4967-B5FB-1C12D366D69C}"/>
               </a:ext>
             </a:extLst>
           </p:cNvPr>
@@ -9340,7 +9261,7 @@
         <p:spPr/>
         <p:txBody>
           <a:bodyPr>
-            <a:normAutofit fontScale="92500" lnSpcReduction="10000"/>
+            <a:normAutofit fontScale="40000" lnSpcReduction="20000"/>
           </a:bodyPr>
           <a:lstStyle/>
           <a:p>
@@ -9349,38 +9270,46 @@
             </a:pPr>
             <a:r>
               <a:rPr lang="en-US" dirty="0"/>
-              <a:t>&lt;big </a:t>
-            </a:r>
-            <a:r>
-              <a:rPr lang="en-US" b="1" dirty="0">
-                <a:highlight>
-                  <a:srgbClr val="FFFF00"/>
-                </a:highlight>
-              </a:rPr>
-              <a:t>style={style} </a:t>
+              <a:t>/*switch (</a:t>
             </a:r>
             <a:r>
               <a:rPr lang="en-US" dirty="0" err="1"/>
-              <a:t>className</a:t>
-            </a:r>
-            <a:r>
-              <a:rPr lang="en-US" dirty="0"/>
-              <a:t>="Fortune-text"&gt; Your fortune is {</a:t>
+              <a:t>fortune.fortuneType</a:t>
+            </a:r>
+            <a:r>
+              <a:rPr lang="en-US" dirty="0"/>
+              <a:t>) {</a:t>
+            </a:r>
+          </a:p>
+          <a:p>
+            <a:pPr marL="0" indent="0">
+              <a:buNone/>
+            </a:pPr>
+            <a:r>
+              <a:rPr lang="en-US" dirty="0"/>
+              <a:t>case </a:t>
             </a:r>
             <a:r>
               <a:rPr lang="en-US" dirty="0" err="1"/>
-              <a:t>fortune.fortune</a:t>
-            </a:r>
-            <a:r>
-              <a:rPr lang="en-US" dirty="0"/>
-              <a:t>}&lt;/big&gt;</a:t>
+              <a:t>Common.FortuneType.Good</a:t>
+            </a:r>
+            <a:r>
+              <a:rPr lang="en-US" dirty="0"/>
+              <a:t>: {</a:t>
             </a:r>
           </a:p>
           <a:p>
             <a:pPr marL="0" indent="0">
               <a:buNone/>
             </a:pPr>
-            <a:endParaRPr lang="en-US" dirty="0"/>
+            <a:r>
+              <a:rPr lang="en-US" dirty="0" err="1"/>
+              <a:t>style.color</a:t>
+            </a:r>
+            <a:r>
+              <a:rPr lang="en-US" dirty="0"/>
+              <a:t> = 'blue';</a:t>
+            </a:r>
           </a:p>
           <a:p>
             <a:pPr marL="0" indent="0">
@@ -9388,7 +9317,7 @@
             </a:pPr>
             <a:r>
               <a:rPr lang="en-US" dirty="0"/>
-              <a:t>Remember how we talked about CSS? </a:t>
+              <a:t>break;</a:t>
             </a:r>
           </a:p>
           <a:p>
@@ -9397,30 +9326,37 @@
             </a:pPr>
             <a:r>
               <a:rPr lang="en-US" dirty="0"/>
-              <a:t>We can make an </a:t>
-            </a:r>
-            <a:r>
-              <a:rPr lang="en-US" i="1" dirty="0"/>
-              <a:t>interface </a:t>
-            </a:r>
-            <a:r>
-              <a:rPr lang="en-US" dirty="0"/>
-              <a:t>about the style we want:</a:t>
+              <a:t>}</a:t>
             </a:r>
           </a:p>
           <a:p>
             <a:pPr marL="0" indent="0">
               <a:buNone/>
             </a:pPr>
-            <a:endParaRPr lang="en-US" dirty="0"/>
+            <a:r>
+              <a:rPr lang="en-US" dirty="0"/>
+              <a:t>case </a:t>
+            </a:r>
+            <a:r>
+              <a:rPr lang="en-US" dirty="0" err="1"/>
+              <a:t>Common.FortuneType.Bad</a:t>
+            </a:r>
+            <a:r>
+              <a:rPr lang="en-US" dirty="0"/>
+              <a:t>: {</a:t>
+            </a:r>
           </a:p>
           <a:p>
             <a:pPr marL="0" indent="0">
               <a:buNone/>
             </a:pPr>
             <a:r>
-              <a:rPr lang="en-US" dirty="0"/>
-              <a:t>interface Style {</a:t>
+              <a:rPr lang="en-US" dirty="0" err="1"/>
+              <a:t>style.color</a:t>
+            </a:r>
+            <a:r>
+              <a:rPr lang="en-US" dirty="0"/>
+              <a:t> = 'red';</a:t>
             </a:r>
           </a:p>
           <a:p>
@@ -9429,7 +9365,7 @@
             </a:pPr>
             <a:r>
               <a:rPr lang="en-US" dirty="0"/>
-              <a:t>	color: string;</a:t>
+              <a:t>break;</a:t>
             </a:r>
           </a:p>
           <a:p>
@@ -9438,15 +9374,24 @@
             </a:pPr>
             <a:r>
               <a:rPr lang="en-US" dirty="0"/>
-              <a:t>	</a:t>
+              <a:t>}</a:t>
+            </a:r>
+          </a:p>
+          <a:p>
+            <a:pPr marL="0" indent="0">
+              <a:buNone/>
+            </a:pPr>
+            <a:r>
+              <a:rPr lang="en-US" dirty="0"/>
+              <a:t>case </a:t>
             </a:r>
             <a:r>
               <a:rPr lang="en-US" dirty="0" err="1"/>
-              <a:t>fontWeight</a:t>
-            </a:r>
-            <a:r>
-              <a:rPr lang="en-US" dirty="0"/>
-              <a:t>: 'bold';</a:t>
+              <a:t>Common.FortuneType.Neutral</a:t>
+            </a:r>
+            <a:r>
+              <a:rPr lang="en-US" dirty="0"/>
+              <a:t>: {</a:t>
             </a:r>
           </a:p>
           <a:p>
@@ -9454,8 +9399,66 @@
               <a:buNone/>
             </a:pPr>
             <a:r>
+              <a:rPr lang="en-US" dirty="0" err="1"/>
+              <a:t>style.color</a:t>
+            </a:r>
+            <a:r>
+              <a:rPr lang="en-US" dirty="0"/>
+              <a:t> = 'purple';</a:t>
+            </a:r>
+          </a:p>
+          <a:p>
+            <a:pPr marL="0" indent="0">
+              <a:buNone/>
+            </a:pPr>
+            <a:r>
+              <a:rPr lang="en-US" dirty="0"/>
+              <a:t>break;</a:t>
+            </a:r>
+          </a:p>
+          <a:p>
+            <a:pPr marL="0" indent="0">
+              <a:buNone/>
+            </a:pPr>
+            <a:r>
               <a:rPr lang="en-US" dirty="0"/>
               <a:t>}</a:t>
+            </a:r>
+          </a:p>
+          <a:p>
+            <a:pPr marL="0" indent="0">
+              <a:buNone/>
+            </a:pPr>
+            <a:r>
+              <a:rPr lang="en-US" dirty="0"/>
+              <a:t>default: {</a:t>
+            </a:r>
+          </a:p>
+          <a:p>
+            <a:pPr marL="0" indent="0">
+              <a:buNone/>
+            </a:pPr>
+            <a:r>
+              <a:rPr lang="en-US" dirty="0"/>
+              <a:t>break;</a:t>
+            </a:r>
+          </a:p>
+          <a:p>
+            <a:pPr marL="0" indent="0">
+              <a:buNone/>
+            </a:pPr>
+            <a:r>
+              <a:rPr lang="en-US" dirty="0"/>
+              <a:t>}</a:t>
+            </a:r>
+          </a:p>
+          <a:p>
+            <a:pPr marL="0" indent="0">
+              <a:buNone/>
+            </a:pPr>
+            <a:r>
+              <a:rPr lang="en-US" dirty="0"/>
+              <a:t>}*/</a:t>
             </a:r>
           </a:p>
           <a:p>
@@ -9469,7 +9472,7 @@
     </p:spTree>
     <p:extLst>
       <p:ext uri="{BB962C8B-B14F-4D97-AF65-F5344CB8AC3E}">
-        <p14:creationId xmlns:p14="http://schemas.microsoft.com/office/powerpoint/2010/main" val="2361844178"/>
+        <p14:creationId xmlns:p14="http://schemas.microsoft.com/office/powerpoint/2010/main" val="880789529"/>
       </p:ext>
     </p:extLst>
   </p:cSld>
@@ -9501,7 +9504,7 @@
           <p:cNvPr id="2" name="Title 1">
             <a:extLst>
               <a:ext uri="{FF2B5EF4-FFF2-40B4-BE49-F238E27FC236}">
-                <a16:creationId xmlns:a16="http://schemas.microsoft.com/office/drawing/2014/main" id="{D7F91FD0-460F-4705-892E-F02FFFBA173D}"/>
+                <a16:creationId xmlns:a16="http://schemas.microsoft.com/office/drawing/2014/main" id="{E8D56148-0197-4D2A-B947-D8CEFF44EE52}"/>
               </a:ext>
             </a:extLst>
           </p:cNvPr>
@@ -9519,7 +9522,7 @@
           <a:p>
             <a:r>
               <a:rPr lang="en-US" dirty="0"/>
-              <a:t>“Switch” – how we choose in computer science</a:t>
+              <a:t>What to do with the fortune type?</a:t>
             </a:r>
           </a:p>
         </p:txBody>
@@ -9529,7 +9532,7 @@
           <p:cNvPr id="3" name="Content Placeholder 2">
             <a:extLst>
               <a:ext uri="{FF2B5EF4-FFF2-40B4-BE49-F238E27FC236}">
-                <a16:creationId xmlns:a16="http://schemas.microsoft.com/office/drawing/2014/main" id="{BA08FCD2-AE02-4967-B5FB-1C12D366D69C}"/>
+                <a16:creationId xmlns:a16="http://schemas.microsoft.com/office/drawing/2014/main" id="{2D6ABF1A-4A69-4D66-A3AF-4330E42FE1E0}"/>
               </a:ext>
             </a:extLst>
           </p:cNvPr>
@@ -9543,7 +9546,7 @@
         <p:spPr/>
         <p:txBody>
           <a:bodyPr>
-            <a:normAutofit fontScale="40000" lnSpcReduction="20000"/>
+            <a:normAutofit/>
           </a:bodyPr>
           <a:lstStyle/>
           <a:p>
@@ -9551,16 +9554,74 @@
               <a:buNone/>
             </a:pPr>
             <a:r>
-              <a:rPr lang="en-US" dirty="0"/>
-              <a:t>/*switch (</a:t>
-            </a:r>
+              <a:rPr lang="en-US" b="1" i="1" dirty="0"/>
+              <a:t>The world is your oyster! </a:t>
+            </a:r>
+          </a:p>
+          <a:p>
+            <a:pPr marL="0" indent="0">
+              <a:buNone/>
+            </a:pPr>
+            <a:r>
+              <a:rPr lang="en-US" dirty="0"/>
+              <a:t>You can add images to show base on the fortune type- set 3 different images for good/bad/neutral:</a:t>
+            </a:r>
+          </a:p>
+          <a:p>
+            <a:pPr lvl="1"/>
             <a:r>
               <a:rPr lang="en-US" dirty="0" err="1"/>
-              <a:t>fortune.fortuneType</a:t>
-            </a:r>
-            <a:r>
-              <a:rPr lang="en-US" dirty="0"/>
-              <a:t>) {</a:t>
+              <a:t>const</a:t>
+            </a:r>
+            <a:r>
+              <a:rPr lang="en-US" dirty="0"/>
+              <a:t> </a:t>
+            </a:r>
+            <a:r>
+              <a:rPr lang="en-US" dirty="0" err="1"/>
+              <a:t>badImage</a:t>
+            </a:r>
+            <a:r>
+              <a:rPr lang="en-US" dirty="0"/>
+              <a:t> = require('../images/unhappy.png');</a:t>
+            </a:r>
+          </a:p>
+          <a:p>
+            <a:pPr lvl="1"/>
+            <a:r>
+              <a:rPr lang="en-US" dirty="0" err="1"/>
+              <a:t>const</a:t>
+            </a:r>
+            <a:r>
+              <a:rPr lang="en-US" dirty="0"/>
+              <a:t> </a:t>
+            </a:r>
+            <a:r>
+              <a:rPr lang="en-US" dirty="0" err="1"/>
+              <a:t>goodImage</a:t>
+            </a:r>
+            <a:r>
+              <a:rPr lang="en-US" dirty="0"/>
+              <a:t> = require('../images/happiness.png');</a:t>
+            </a:r>
+          </a:p>
+          <a:p>
+            <a:pPr lvl="1"/>
+            <a:r>
+              <a:rPr lang="en-US" dirty="0" err="1"/>
+              <a:t>const</a:t>
+            </a:r>
+            <a:r>
+              <a:rPr lang="en-US" dirty="0"/>
+              <a:t> </a:t>
+            </a:r>
+            <a:r>
+              <a:rPr lang="en-US" dirty="0" err="1"/>
+              <a:t>neutralImage</a:t>
+            </a:r>
+            <a:r>
+              <a:rPr lang="en-US" dirty="0"/>
+              <a:t> = require('../images/neutral.jpg');}</a:t>
             </a:r>
           </a:p>
           <a:p>
@@ -9569,192 +9630,15 @@
             </a:pPr>
             <a:r>
               <a:rPr lang="en-US" dirty="0"/>
-              <a:t>case </a:t>
-            </a:r>
-            <a:r>
-              <a:rPr lang="en-US" dirty="0" err="1"/>
-              <a:t>Common.FortuneType.Good</a:t>
-            </a:r>
-            <a:r>
-              <a:rPr lang="en-US" dirty="0"/>
-              <a:t>: {</a:t>
-            </a:r>
-          </a:p>
-          <a:p>
-            <a:pPr marL="0" indent="0">
-              <a:buNone/>
-            </a:pPr>
-            <a:r>
-              <a:rPr lang="en-US" dirty="0" err="1"/>
-              <a:t>style.color</a:t>
-            </a:r>
-            <a:r>
-              <a:rPr lang="en-US" dirty="0"/>
-              <a:t> = 'blue';</a:t>
-            </a:r>
-          </a:p>
-          <a:p>
-            <a:pPr marL="0" indent="0">
-              <a:buNone/>
-            </a:pPr>
-            <a:r>
-              <a:rPr lang="en-US" dirty="0"/>
-              <a:t>break;</a:t>
-            </a:r>
-          </a:p>
-          <a:p>
-            <a:pPr marL="0" indent="0">
-              <a:buNone/>
-            </a:pPr>
-            <a:r>
-              <a:rPr lang="en-US" dirty="0"/>
-              <a:t>}</a:t>
-            </a:r>
-          </a:p>
-          <a:p>
-            <a:pPr marL="0" indent="0">
-              <a:buNone/>
-            </a:pPr>
-            <a:r>
-              <a:rPr lang="en-US" dirty="0"/>
-              <a:t>case </a:t>
-            </a:r>
-            <a:r>
-              <a:rPr lang="en-US" dirty="0" err="1"/>
-              <a:t>Common.FortuneType.Bad</a:t>
-            </a:r>
-            <a:r>
-              <a:rPr lang="en-US" dirty="0"/>
-              <a:t>: {</a:t>
-            </a:r>
-          </a:p>
-          <a:p>
-            <a:pPr marL="0" indent="0">
-              <a:buNone/>
-            </a:pPr>
-            <a:r>
-              <a:rPr lang="en-US" dirty="0" err="1"/>
-              <a:t>style.color</a:t>
-            </a:r>
-            <a:r>
-              <a:rPr lang="en-US" dirty="0"/>
-              <a:t> = 'red';</a:t>
-            </a:r>
-          </a:p>
-          <a:p>
-            <a:pPr marL="0" indent="0">
-              <a:buNone/>
-            </a:pPr>
-            <a:r>
-              <a:rPr lang="en-US" dirty="0"/>
-              <a:t>break;</a:t>
-            </a:r>
-          </a:p>
-          <a:p>
-            <a:pPr marL="0" indent="0">
-              <a:buNone/>
-            </a:pPr>
-            <a:r>
-              <a:rPr lang="en-US" dirty="0"/>
-              <a:t>}</a:t>
-            </a:r>
-          </a:p>
-          <a:p>
-            <a:pPr marL="0" indent="0">
-              <a:buNone/>
-            </a:pPr>
-            <a:r>
-              <a:rPr lang="en-US" dirty="0"/>
-              <a:t>case </a:t>
-            </a:r>
-            <a:r>
-              <a:rPr lang="en-US" dirty="0" err="1"/>
-              <a:t>Common.FortuneType.Neutral</a:t>
-            </a:r>
-            <a:r>
-              <a:rPr lang="en-US" dirty="0"/>
-              <a:t>: {</a:t>
-            </a:r>
-          </a:p>
-          <a:p>
-            <a:pPr marL="0" indent="0">
-              <a:buNone/>
-            </a:pPr>
-            <a:r>
-              <a:rPr lang="en-US" dirty="0" err="1"/>
-              <a:t>style.color</a:t>
-            </a:r>
-            <a:r>
-              <a:rPr lang="en-US" dirty="0"/>
-              <a:t> = 'purple';</a:t>
-            </a:r>
-          </a:p>
-          <a:p>
-            <a:pPr marL="0" indent="0">
-              <a:buNone/>
-            </a:pPr>
-            <a:r>
-              <a:rPr lang="en-US" dirty="0"/>
-              <a:t>break;</a:t>
-            </a:r>
-          </a:p>
-          <a:p>
-            <a:pPr marL="0" indent="0">
-              <a:buNone/>
-            </a:pPr>
-            <a:r>
-              <a:rPr lang="en-US" dirty="0"/>
-              <a:t>}</a:t>
-            </a:r>
-          </a:p>
-          <a:p>
-            <a:pPr marL="0" indent="0">
-              <a:buNone/>
-            </a:pPr>
-            <a:r>
-              <a:rPr lang="en-US" dirty="0"/>
-              <a:t>default: {</a:t>
-            </a:r>
-          </a:p>
-          <a:p>
-            <a:pPr marL="0" indent="0">
-              <a:buNone/>
-            </a:pPr>
-            <a:r>
-              <a:rPr lang="en-US" dirty="0"/>
-              <a:t>break;</a:t>
-            </a:r>
-          </a:p>
-          <a:p>
-            <a:pPr marL="0" indent="0">
-              <a:buNone/>
-            </a:pPr>
-            <a:r>
-              <a:rPr lang="en-US" dirty="0"/>
-              <a:t>}</a:t>
-            </a:r>
-          </a:p>
-          <a:p>
-            <a:pPr marL="0" indent="0">
-              <a:buNone/>
-            </a:pPr>
-            <a:r>
-              <a:rPr lang="en-US" dirty="0"/>
-              <a:t>}*/</a:t>
-            </a:r>
-          </a:p>
-          <a:p>
-            <a:pPr marL="0" indent="0">
-              <a:buNone/>
-            </a:pPr>
-            <a:endParaRPr lang="en-US" dirty="0"/>
+              <a:t>Then add an image variable and set it in your switch statement</a:t>
+            </a:r>
           </a:p>
         </p:txBody>
       </p:sp>
     </p:spTree>
     <p:extLst>
       <p:ext uri="{BB962C8B-B14F-4D97-AF65-F5344CB8AC3E}">
-        <p14:creationId xmlns:p14="http://schemas.microsoft.com/office/powerpoint/2010/main" val="880789529"/>
+        <p14:creationId xmlns:p14="http://schemas.microsoft.com/office/powerpoint/2010/main" val="4077000602"/>
       </p:ext>
     </p:extLst>
   </p:cSld>
@@ -9786,7 +9670,7 @@
           <p:cNvPr id="2" name="Title 1">
             <a:extLst>
               <a:ext uri="{FF2B5EF4-FFF2-40B4-BE49-F238E27FC236}">
-                <a16:creationId xmlns:a16="http://schemas.microsoft.com/office/drawing/2014/main" id="{E8D56148-0197-4D2A-B947-D8CEFF44EE52}"/>
+                <a16:creationId xmlns:a16="http://schemas.microsoft.com/office/drawing/2014/main" id="{F17E8816-9BF2-4AB7-95B9-2A4DD6807E1C}"/>
               </a:ext>
             </a:extLst>
           </p:cNvPr>
@@ -9804,7 +9688,15 @@
           <a:p>
             <a:r>
               <a:rPr lang="en-US" dirty="0"/>
-              <a:t>What to do with the fortune type?</a:t>
+              <a:t>What to do with the fortune type </a:t>
+            </a:r>
+            <a:r>
+              <a:rPr lang="en-US" dirty="0" err="1"/>
+              <a:t>cont</a:t>
+            </a:r>
+            <a:r>
+              <a:rPr lang="en-US" dirty="0"/>
+              <a:t>…</a:t>
             </a:r>
           </a:p>
         </p:txBody>
@@ -9814,7 +9706,7 @@
           <p:cNvPr id="3" name="Content Placeholder 2">
             <a:extLst>
               <a:ext uri="{FF2B5EF4-FFF2-40B4-BE49-F238E27FC236}">
-                <a16:creationId xmlns:a16="http://schemas.microsoft.com/office/drawing/2014/main" id="{2D6ABF1A-4A69-4D66-A3AF-4330E42FE1E0}"/>
+                <a16:creationId xmlns:a16="http://schemas.microsoft.com/office/drawing/2014/main" id="{6A22B13E-025E-4392-9551-4FE1C5532E90}"/>
               </a:ext>
             </a:extLst>
           </p:cNvPr>
@@ -9827,33 +9719,59 @@
         </p:nvSpPr>
         <p:spPr/>
         <p:txBody>
-          <a:bodyPr>
-            <a:normAutofit/>
-          </a:bodyPr>
-          <a:lstStyle/>
-          <a:p>
-            <a:pPr marL="0" indent="0">
+          <a:bodyPr/>
+          <a:lstStyle/>
+          <a:p>
+            <a:r>
+              <a:rPr lang="en-US" dirty="0"/>
+              <a:t>To apply the image, just add it to your render HTML:</a:t>
+            </a:r>
+          </a:p>
+          <a:p>
+            <a:pPr marL="457200" lvl="1" indent="0">
               <a:buNone/>
             </a:pPr>
             <a:r>
-              <a:rPr lang="en-US" b="1" i="1" dirty="0"/>
-              <a:t>The world is your oyster! </a:t>
-            </a:r>
-          </a:p>
-          <a:p>
-            <a:pPr marL="0" indent="0">
+              <a:rPr lang="en-US" dirty="0"/>
+              <a:t>&lt;div&gt;</a:t>
+            </a:r>
+          </a:p>
+          <a:p>
+            <a:pPr marL="457200" lvl="1" indent="0">
               <a:buNone/>
             </a:pPr>
             <a:r>
               <a:rPr lang="en-US" dirty="0"/>
-              <a:t>You can add images to show base on the fortune type- set 3 different images for good/bad/neutral:</a:t>
-            </a:r>
-          </a:p>
-          <a:p>
-            <a:pPr lvl="1"/>
+              <a:t>&lt;div style={style} </a:t>
+            </a:r>
             <a:r>
               <a:rPr lang="en-US" dirty="0" err="1"/>
-              <a:t>const</a:t>
+              <a:t>className</a:t>
+            </a:r>
+            <a:r>
+              <a:rPr lang="en-US" dirty="0"/>
+              <a:t>="Fortune-text"&gt; Your fortune is {</a:t>
+            </a:r>
+            <a:r>
+              <a:rPr lang="en-US" dirty="0" err="1"/>
+              <a:t>fortune.fortune</a:t>
+            </a:r>
+            <a:r>
+              <a:rPr lang="en-US" dirty="0"/>
+              <a:t>}&lt;/div&gt;</a:t>
+            </a:r>
+          </a:p>
+          <a:p>
+            <a:pPr marL="457200" lvl="1" indent="0">
+              <a:buNone/>
+            </a:pPr>
+            <a:r>
+              <a:rPr lang="en-US" dirty="0"/>
+              <a:t>&lt;</a:t>
+            </a:r>
+            <a:r>
+              <a:rPr lang="en-US" dirty="0" err="1"/>
+              <a:t>img</a:t>
             </a:r>
             <a:r>
               <a:rPr lang="en-US" dirty="0"/>
@@ -9861,66 +9779,34 @@
             </a:r>
             <a:r>
               <a:rPr lang="en-US" dirty="0" err="1"/>
-              <a:t>badImage</a:t>
-            </a:r>
-            <a:r>
-              <a:rPr lang="en-US" dirty="0"/>
-              <a:t> = require('../images/unhappy.png');</a:t>
-            </a:r>
-          </a:p>
-          <a:p>
-            <a:pPr lvl="1"/>
-            <a:r>
-              <a:rPr lang="en-US" dirty="0" err="1"/>
-              <a:t>const</a:t>
-            </a:r>
-            <a:r>
-              <a:rPr lang="en-US" dirty="0"/>
-              <a:t> </a:t>
-            </a:r>
-            <a:r>
-              <a:rPr lang="en-US" dirty="0" err="1"/>
-              <a:t>goodImage</a:t>
-            </a:r>
-            <a:r>
-              <a:rPr lang="en-US" dirty="0"/>
-              <a:t> = require('../images/happiness.png');</a:t>
-            </a:r>
-          </a:p>
-          <a:p>
-            <a:pPr lvl="1"/>
-            <a:r>
-              <a:rPr lang="en-US" dirty="0" err="1"/>
-              <a:t>const</a:t>
-            </a:r>
-            <a:r>
-              <a:rPr lang="en-US" dirty="0"/>
-              <a:t> </a:t>
-            </a:r>
-            <a:r>
-              <a:rPr lang="en-US" dirty="0" err="1"/>
-              <a:t>neutralImage</a:t>
-            </a:r>
-            <a:r>
-              <a:rPr lang="en-US" dirty="0"/>
-              <a:t> = require('../images/neutral.jpg');}</a:t>
-            </a:r>
-          </a:p>
-          <a:p>
-            <a:pPr marL="0" indent="0">
+              <a:t>src</a:t>
+            </a:r>
+            <a:r>
+              <a:rPr lang="en-US" dirty="0"/>
+              <a:t>={image} /&gt;</a:t>
+            </a:r>
+          </a:p>
+          <a:p>
+            <a:pPr marL="457200" lvl="1" indent="0">
               <a:buNone/>
             </a:pPr>
             <a:r>
               <a:rPr lang="en-US" dirty="0"/>
-              <a:t>Then add an image variable and set it in your switch statement</a:t>
-            </a:r>
+              <a:t>&lt;/div&gt;</a:t>
+            </a:r>
+          </a:p>
+          <a:p>
+            <a:pPr marL="457200" lvl="1" indent="0">
+              <a:buNone/>
+            </a:pPr>
+            <a:endParaRPr lang="en-US" dirty="0"/>
           </a:p>
         </p:txBody>
       </p:sp>
     </p:spTree>
     <p:extLst>
       <p:ext uri="{BB962C8B-B14F-4D97-AF65-F5344CB8AC3E}">
-        <p14:creationId xmlns:p14="http://schemas.microsoft.com/office/powerpoint/2010/main" val="4077000602"/>
+        <p14:creationId xmlns:p14="http://schemas.microsoft.com/office/powerpoint/2010/main" val="1334404234"/>
       </p:ext>
     </p:extLst>
   </p:cSld>
@@ -10014,174 +9900,6 @@
 </file>
 
 <file path=ppt/slides/slide30.xml><?xml version="1.0" encoding="utf-8"?>
-<p:sld xmlns:a="http://schemas.openxmlformats.org/drawingml/2006/main" xmlns:r="http://schemas.openxmlformats.org/officeDocument/2006/relationships" xmlns:p="http://schemas.openxmlformats.org/presentationml/2006/main">
-  <p:cSld>
-    <p:spTree>
-      <p:nvGrpSpPr>
-        <p:cNvPr id="1" name=""/>
-        <p:cNvGrpSpPr/>
-        <p:nvPr/>
-      </p:nvGrpSpPr>
-      <p:grpSpPr>
-        <a:xfrm>
-          <a:off x="0" y="0"/>
-          <a:ext cx="0" cy="0"/>
-          <a:chOff x="0" y="0"/>
-          <a:chExt cx="0" cy="0"/>
-        </a:xfrm>
-      </p:grpSpPr>
-      <p:sp>
-        <p:nvSpPr>
-          <p:cNvPr id="2" name="Title 1">
-            <a:extLst>
-              <a:ext uri="{FF2B5EF4-FFF2-40B4-BE49-F238E27FC236}">
-                <a16:creationId xmlns:a16="http://schemas.microsoft.com/office/drawing/2014/main" id="{F17E8816-9BF2-4AB7-95B9-2A4DD6807E1C}"/>
-              </a:ext>
-            </a:extLst>
-          </p:cNvPr>
-          <p:cNvSpPr>
-            <a:spLocks noGrp="1"/>
-          </p:cNvSpPr>
-          <p:nvPr>
-            <p:ph type="title"/>
-          </p:nvPr>
-        </p:nvSpPr>
-        <p:spPr/>
-        <p:txBody>
-          <a:bodyPr/>
-          <a:lstStyle/>
-          <a:p>
-            <a:r>
-              <a:rPr lang="en-US" dirty="0"/>
-              <a:t>What to do with the fortune type </a:t>
-            </a:r>
-            <a:r>
-              <a:rPr lang="en-US" dirty="0" err="1"/>
-              <a:t>cont</a:t>
-            </a:r>
-            <a:r>
-              <a:rPr lang="en-US" dirty="0"/>
-              <a:t>…</a:t>
-            </a:r>
-          </a:p>
-        </p:txBody>
-      </p:sp>
-      <p:sp>
-        <p:nvSpPr>
-          <p:cNvPr id="3" name="Content Placeholder 2">
-            <a:extLst>
-              <a:ext uri="{FF2B5EF4-FFF2-40B4-BE49-F238E27FC236}">
-                <a16:creationId xmlns:a16="http://schemas.microsoft.com/office/drawing/2014/main" id="{6A22B13E-025E-4392-9551-4FE1C5532E90}"/>
-              </a:ext>
-            </a:extLst>
-          </p:cNvPr>
-          <p:cNvSpPr>
-            <a:spLocks noGrp="1"/>
-          </p:cNvSpPr>
-          <p:nvPr>
-            <p:ph idx="1"/>
-          </p:nvPr>
-        </p:nvSpPr>
-        <p:spPr/>
-        <p:txBody>
-          <a:bodyPr/>
-          <a:lstStyle/>
-          <a:p>
-            <a:r>
-              <a:rPr lang="en-US" dirty="0"/>
-              <a:t>To apply the image, just add it to your render HTML:</a:t>
-            </a:r>
-          </a:p>
-          <a:p>
-            <a:pPr marL="457200" lvl="1" indent="0">
-              <a:buNone/>
-            </a:pPr>
-            <a:r>
-              <a:rPr lang="en-US" dirty="0"/>
-              <a:t>&lt;div&gt;</a:t>
-            </a:r>
-          </a:p>
-          <a:p>
-            <a:pPr marL="457200" lvl="1" indent="0">
-              <a:buNone/>
-            </a:pPr>
-            <a:r>
-              <a:rPr lang="en-US" dirty="0"/>
-              <a:t>&lt;div style={style} </a:t>
-            </a:r>
-            <a:r>
-              <a:rPr lang="en-US" dirty="0" err="1"/>
-              <a:t>className</a:t>
-            </a:r>
-            <a:r>
-              <a:rPr lang="en-US" dirty="0"/>
-              <a:t>="Fortune-text"&gt; Your fortune is {</a:t>
-            </a:r>
-            <a:r>
-              <a:rPr lang="en-US" dirty="0" err="1"/>
-              <a:t>fortune.fortune</a:t>
-            </a:r>
-            <a:r>
-              <a:rPr lang="en-US" dirty="0"/>
-              <a:t>}&lt;/div&gt;</a:t>
-            </a:r>
-          </a:p>
-          <a:p>
-            <a:pPr marL="457200" lvl="1" indent="0">
-              <a:buNone/>
-            </a:pPr>
-            <a:r>
-              <a:rPr lang="en-US" dirty="0"/>
-              <a:t>&lt;</a:t>
-            </a:r>
-            <a:r>
-              <a:rPr lang="en-US" dirty="0" err="1"/>
-              <a:t>img</a:t>
-            </a:r>
-            <a:r>
-              <a:rPr lang="en-US" dirty="0"/>
-              <a:t> </a:t>
-            </a:r>
-            <a:r>
-              <a:rPr lang="en-US" dirty="0" err="1"/>
-              <a:t>src</a:t>
-            </a:r>
-            <a:r>
-              <a:rPr lang="en-US" dirty="0"/>
-              <a:t>={image} /&gt;</a:t>
-            </a:r>
-          </a:p>
-          <a:p>
-            <a:pPr marL="457200" lvl="1" indent="0">
-              <a:buNone/>
-            </a:pPr>
-            <a:r>
-              <a:rPr lang="en-US" dirty="0"/>
-              <a:t>&lt;/div&gt;</a:t>
-            </a:r>
-          </a:p>
-          <a:p>
-            <a:pPr marL="457200" lvl="1" indent="0">
-              <a:buNone/>
-            </a:pPr>
-            <a:endParaRPr lang="en-US" dirty="0"/>
-          </a:p>
-        </p:txBody>
-      </p:sp>
-    </p:spTree>
-    <p:extLst>
-      <p:ext uri="{BB962C8B-B14F-4D97-AF65-F5344CB8AC3E}">
-        <p14:creationId xmlns:p14="http://schemas.microsoft.com/office/powerpoint/2010/main" val="1334404234"/>
-      </p:ext>
-    </p:extLst>
-  </p:cSld>
-  <p:clrMapOvr>
-    <a:masterClrMapping/>
-  </p:clrMapOvr>
-</p:sld>
-</file>
-
-<file path=ppt/slides/slide31.xml><?xml version="1.0" encoding="utf-8"?>
 <p:sld xmlns:a="http://schemas.openxmlformats.org/drawingml/2006/main" xmlns:r="http://schemas.openxmlformats.org/officeDocument/2006/relationships" xmlns:p="http://schemas.openxmlformats.org/presentationml/2006/main">
   <p:cSld>
     <p:spTree>

</xml_diff>

<commit_message>
add in images to the skeleton
</commit_message>
<xml_diff>
--- a/magic-eight-ball/ReactPresentation.pptx
+++ b/magic-eight-ball/ReactPresentation.pptx
@@ -9154,10 +9154,9 @@
               <a:buNone/>
             </a:pPr>
             <a:r>
-              <a:rPr lang="en-US"/>
+              <a:rPr lang="en-US" dirty="0"/>
               <a:t>}</a:t>
             </a:r>
-            <a:endParaRPr lang="en-US" dirty="0"/>
           </a:p>
           <a:p>
             <a:pPr marL="0" indent="0">
@@ -9766,8 +9765,13 @@
             </a:r>
             <a:r>
               <a:rPr lang="en-US" dirty="0"/>
-              <a:t>={image} /&gt;</a:t>
-            </a:r>
+              <a:t>={image</a:t>
+            </a:r>
+            <a:r>
+              <a:rPr lang="en-US"/>
+              <a:t>} /&gt;</a:t>
+            </a:r>
+            <a:endParaRPr lang="en-US" dirty="0"/>
           </a:p>
           <a:p>
             <a:pPr marL="457200" lvl="1" indent="0">

</xml_diff>